<commit_message>
Revert "commit new changes"
This reverts commit bd3295c8820640f2d79a982f9df05831b35edd4e.
</commit_message>
<xml_diff>
--- a/Powerpoint/PresentationDraft.pptx
+++ b/Powerpoint/PresentationDraft.pptx
@@ -6,12 +6,6 @@
   </p:sldMasterIdLst>
   <p:sldIdLst>
     <p:sldId id="256" r:id="rId2"/>
-    <p:sldId id="257" r:id="rId3"/>
-    <p:sldId id="258" r:id="rId4"/>
-    <p:sldId id="259" r:id="rId5"/>
-    <p:sldId id="263" r:id="rId6"/>
-    <p:sldId id="262" r:id="rId7"/>
-    <p:sldId id="261" r:id="rId8"/>
   </p:sldIdLst>
   <p:sldSz cx="9144000" cy="6858000" type="screen4x3"/>
   <p:notesSz cx="6858000" cy="9144000"/>
@@ -287,15 +281,7 @@
             <p:ph type="dt" sz="half" idx="10"/>
           </p:nvPr>
         </p:nvSpPr>
-        <p:spPr>
-          <a:xfrm>
-            <a:off x="457200" y="6356350"/>
-            <a:ext cx="2133600" cy="365125"/>
-          </a:xfrm>
-          <a:prstGeom prst="rect">
-            <a:avLst/>
-          </a:prstGeom>
-        </p:spPr>
+        <p:spPr/>
         <p:txBody>
           <a:bodyPr/>
           <a:lstStyle/>
@@ -318,15 +304,7 @@
             <p:ph type="ftr" sz="quarter" idx="11"/>
           </p:nvPr>
         </p:nvSpPr>
-        <p:spPr>
-          <a:xfrm>
-            <a:off x="3124200" y="6356350"/>
-            <a:ext cx="2895600" cy="365125"/>
-          </a:xfrm>
-          <a:prstGeom prst="rect">
-            <a:avLst/>
-          </a:prstGeom>
-        </p:spPr>
+        <p:spPr/>
         <p:txBody>
           <a:bodyPr/>
           <a:lstStyle/>
@@ -345,15 +323,7 @@
             <p:ph type="sldNum" sz="quarter" idx="12"/>
           </p:nvPr>
         </p:nvSpPr>
-        <p:spPr>
-          <a:xfrm>
-            <a:off x="6553200" y="6356350"/>
-            <a:ext cx="2133600" cy="365125"/>
-          </a:xfrm>
-          <a:prstGeom prst="rect">
-            <a:avLst/>
-          </a:prstGeom>
-        </p:spPr>
+        <p:spPr/>
         <p:txBody>
           <a:bodyPr/>
           <a:lstStyle/>
@@ -481,15 +451,7 @@
             <p:ph type="dt" sz="half" idx="10"/>
           </p:nvPr>
         </p:nvSpPr>
-        <p:spPr>
-          <a:xfrm>
-            <a:off x="457200" y="6356350"/>
-            <a:ext cx="2133600" cy="365125"/>
-          </a:xfrm>
-          <a:prstGeom prst="rect">
-            <a:avLst/>
-          </a:prstGeom>
-        </p:spPr>
+        <p:spPr/>
         <p:txBody>
           <a:bodyPr/>
           <a:lstStyle/>
@@ -512,15 +474,7 @@
             <p:ph type="ftr" sz="quarter" idx="11"/>
           </p:nvPr>
         </p:nvSpPr>
-        <p:spPr>
-          <a:xfrm>
-            <a:off x="3124200" y="6356350"/>
-            <a:ext cx="2895600" cy="365125"/>
-          </a:xfrm>
-          <a:prstGeom prst="rect">
-            <a:avLst/>
-          </a:prstGeom>
-        </p:spPr>
+        <p:spPr/>
         <p:txBody>
           <a:bodyPr/>
           <a:lstStyle/>
@@ -539,15 +493,7 @@
             <p:ph type="sldNum" sz="quarter" idx="12"/>
           </p:nvPr>
         </p:nvSpPr>
-        <p:spPr>
-          <a:xfrm>
-            <a:off x="6553200" y="6356350"/>
-            <a:ext cx="2133600" cy="365125"/>
-          </a:xfrm>
-          <a:prstGeom prst="rect">
-            <a:avLst/>
-          </a:prstGeom>
-        </p:spPr>
+        <p:spPr/>
         <p:txBody>
           <a:bodyPr/>
           <a:lstStyle/>
@@ -685,15 +631,7 @@
             <p:ph type="dt" sz="half" idx="10"/>
           </p:nvPr>
         </p:nvSpPr>
-        <p:spPr>
-          <a:xfrm>
-            <a:off x="457200" y="6356350"/>
-            <a:ext cx="2133600" cy="365125"/>
-          </a:xfrm>
-          <a:prstGeom prst="rect">
-            <a:avLst/>
-          </a:prstGeom>
-        </p:spPr>
+        <p:spPr/>
         <p:txBody>
           <a:bodyPr/>
           <a:lstStyle/>
@@ -716,15 +654,7 @@
             <p:ph type="ftr" sz="quarter" idx="11"/>
           </p:nvPr>
         </p:nvSpPr>
-        <p:spPr>
-          <a:xfrm>
-            <a:off x="3124200" y="6356350"/>
-            <a:ext cx="2895600" cy="365125"/>
-          </a:xfrm>
-          <a:prstGeom prst="rect">
-            <a:avLst/>
-          </a:prstGeom>
-        </p:spPr>
+        <p:spPr/>
         <p:txBody>
           <a:bodyPr/>
           <a:lstStyle/>
@@ -743,15 +673,7 @@
             <p:ph type="sldNum" sz="quarter" idx="12"/>
           </p:nvPr>
         </p:nvSpPr>
-        <p:spPr>
-          <a:xfrm>
-            <a:off x="6553200" y="6356350"/>
-            <a:ext cx="2133600" cy="365125"/>
-          </a:xfrm>
-          <a:prstGeom prst="rect">
-            <a:avLst/>
-          </a:prstGeom>
-        </p:spPr>
+        <p:spPr/>
         <p:txBody>
           <a:bodyPr/>
           <a:lstStyle/>
@@ -879,15 +801,7 @@
             <p:ph type="dt" sz="half" idx="10"/>
           </p:nvPr>
         </p:nvSpPr>
-        <p:spPr>
-          <a:xfrm>
-            <a:off x="457200" y="6356350"/>
-            <a:ext cx="2133600" cy="365125"/>
-          </a:xfrm>
-          <a:prstGeom prst="rect">
-            <a:avLst/>
-          </a:prstGeom>
-        </p:spPr>
+        <p:spPr/>
         <p:txBody>
           <a:bodyPr/>
           <a:lstStyle/>
@@ -910,15 +824,7 @@
             <p:ph type="ftr" sz="quarter" idx="11"/>
           </p:nvPr>
         </p:nvSpPr>
-        <p:spPr>
-          <a:xfrm>
-            <a:off x="3124200" y="6356350"/>
-            <a:ext cx="2895600" cy="365125"/>
-          </a:xfrm>
-          <a:prstGeom prst="rect">
-            <a:avLst/>
-          </a:prstGeom>
-        </p:spPr>
+        <p:spPr/>
         <p:txBody>
           <a:bodyPr/>
           <a:lstStyle/>
@@ -937,15 +843,7 @@
             <p:ph type="sldNum" sz="quarter" idx="12"/>
           </p:nvPr>
         </p:nvSpPr>
-        <p:spPr>
-          <a:xfrm>
-            <a:off x="6553200" y="6356350"/>
-            <a:ext cx="2133600" cy="365125"/>
-          </a:xfrm>
-          <a:prstGeom prst="rect">
-            <a:avLst/>
-          </a:prstGeom>
-        </p:spPr>
+        <p:spPr/>
         <p:txBody>
           <a:bodyPr/>
           <a:lstStyle/>
@@ -1149,15 +1047,7 @@
             <p:ph type="dt" sz="half" idx="10"/>
           </p:nvPr>
         </p:nvSpPr>
-        <p:spPr>
-          <a:xfrm>
-            <a:off x="457200" y="6356350"/>
-            <a:ext cx="2133600" cy="365125"/>
-          </a:xfrm>
-          <a:prstGeom prst="rect">
-            <a:avLst/>
-          </a:prstGeom>
-        </p:spPr>
+        <p:spPr/>
         <p:txBody>
           <a:bodyPr/>
           <a:lstStyle/>
@@ -1180,15 +1070,7 @@
             <p:ph type="ftr" sz="quarter" idx="11"/>
           </p:nvPr>
         </p:nvSpPr>
-        <p:spPr>
-          <a:xfrm>
-            <a:off x="3124200" y="6356350"/>
-            <a:ext cx="2895600" cy="365125"/>
-          </a:xfrm>
-          <a:prstGeom prst="rect">
-            <a:avLst/>
-          </a:prstGeom>
-        </p:spPr>
+        <p:spPr/>
         <p:txBody>
           <a:bodyPr/>
           <a:lstStyle/>
@@ -1207,15 +1089,7 @@
             <p:ph type="sldNum" sz="quarter" idx="12"/>
           </p:nvPr>
         </p:nvSpPr>
-        <p:spPr>
-          <a:xfrm>
-            <a:off x="6553200" y="6356350"/>
-            <a:ext cx="2133600" cy="365125"/>
-          </a:xfrm>
-          <a:prstGeom prst="rect">
-            <a:avLst/>
-          </a:prstGeom>
-        </p:spPr>
+        <p:spPr/>
         <p:txBody>
           <a:bodyPr/>
           <a:lstStyle/>
@@ -1461,15 +1335,7 @@
             <p:ph type="dt" sz="half" idx="10"/>
           </p:nvPr>
         </p:nvSpPr>
-        <p:spPr>
-          <a:xfrm>
-            <a:off x="457200" y="6356350"/>
-            <a:ext cx="2133600" cy="365125"/>
-          </a:xfrm>
-          <a:prstGeom prst="rect">
-            <a:avLst/>
-          </a:prstGeom>
-        </p:spPr>
+        <p:spPr/>
         <p:txBody>
           <a:bodyPr/>
           <a:lstStyle/>
@@ -1492,15 +1358,7 @@
             <p:ph type="ftr" sz="quarter" idx="11"/>
           </p:nvPr>
         </p:nvSpPr>
-        <p:spPr>
-          <a:xfrm>
-            <a:off x="3124200" y="6356350"/>
-            <a:ext cx="2895600" cy="365125"/>
-          </a:xfrm>
-          <a:prstGeom prst="rect">
-            <a:avLst/>
-          </a:prstGeom>
-        </p:spPr>
+        <p:spPr/>
         <p:txBody>
           <a:bodyPr/>
           <a:lstStyle/>
@@ -1519,15 +1377,7 @@
             <p:ph type="sldNum" sz="quarter" idx="12"/>
           </p:nvPr>
         </p:nvSpPr>
-        <p:spPr>
-          <a:xfrm>
-            <a:off x="6553200" y="6356350"/>
-            <a:ext cx="2133600" cy="365125"/>
-          </a:xfrm>
-          <a:prstGeom prst="rect">
-            <a:avLst/>
-          </a:prstGeom>
-        </p:spPr>
+        <p:spPr/>
         <p:txBody>
           <a:bodyPr/>
           <a:lstStyle/>
@@ -1907,15 +1757,7 @@
             <p:ph type="dt" sz="half" idx="10"/>
           </p:nvPr>
         </p:nvSpPr>
-        <p:spPr>
-          <a:xfrm>
-            <a:off x="457200" y="6356350"/>
-            <a:ext cx="2133600" cy="365125"/>
-          </a:xfrm>
-          <a:prstGeom prst="rect">
-            <a:avLst/>
-          </a:prstGeom>
-        </p:spPr>
+        <p:spPr/>
         <p:txBody>
           <a:bodyPr/>
           <a:lstStyle/>
@@ -1938,15 +1780,7 @@
             <p:ph type="ftr" sz="quarter" idx="11"/>
           </p:nvPr>
         </p:nvSpPr>
-        <p:spPr>
-          <a:xfrm>
-            <a:off x="3124200" y="6356350"/>
-            <a:ext cx="2895600" cy="365125"/>
-          </a:xfrm>
-          <a:prstGeom prst="rect">
-            <a:avLst/>
-          </a:prstGeom>
-        </p:spPr>
+        <p:spPr/>
         <p:txBody>
           <a:bodyPr/>
           <a:lstStyle/>
@@ -1965,15 +1799,7 @@
             <p:ph type="sldNum" sz="quarter" idx="12"/>
           </p:nvPr>
         </p:nvSpPr>
-        <p:spPr>
-          <a:xfrm>
-            <a:off x="6553200" y="6356350"/>
-            <a:ext cx="2133600" cy="365125"/>
-          </a:xfrm>
-          <a:prstGeom prst="rect">
-            <a:avLst/>
-          </a:prstGeom>
-        </p:spPr>
+        <p:spPr/>
         <p:txBody>
           <a:bodyPr/>
           <a:lstStyle/>
@@ -2049,15 +1875,7 @@
             <p:ph type="dt" sz="half" idx="10"/>
           </p:nvPr>
         </p:nvSpPr>
-        <p:spPr>
-          <a:xfrm>
-            <a:off x="457200" y="6356350"/>
-            <a:ext cx="2133600" cy="365125"/>
-          </a:xfrm>
-          <a:prstGeom prst="rect">
-            <a:avLst/>
-          </a:prstGeom>
-        </p:spPr>
+        <p:spPr/>
         <p:txBody>
           <a:bodyPr/>
           <a:lstStyle/>
@@ -2080,15 +1898,7 @@
             <p:ph type="ftr" sz="quarter" idx="11"/>
           </p:nvPr>
         </p:nvSpPr>
-        <p:spPr>
-          <a:xfrm>
-            <a:off x="3124200" y="6356350"/>
-            <a:ext cx="2895600" cy="365125"/>
-          </a:xfrm>
-          <a:prstGeom prst="rect">
-            <a:avLst/>
-          </a:prstGeom>
-        </p:spPr>
+        <p:spPr/>
         <p:txBody>
           <a:bodyPr/>
           <a:lstStyle/>
@@ -2107,15 +1917,7 @@
             <p:ph type="sldNum" sz="quarter" idx="12"/>
           </p:nvPr>
         </p:nvSpPr>
-        <p:spPr>
-          <a:xfrm>
-            <a:off x="6553200" y="6356350"/>
-            <a:ext cx="2133600" cy="365125"/>
-          </a:xfrm>
-          <a:prstGeom prst="rect">
-            <a:avLst/>
-          </a:prstGeom>
-        </p:spPr>
+        <p:spPr/>
         <p:txBody>
           <a:bodyPr/>
           <a:lstStyle/>
@@ -2168,15 +1970,7 @@
             <p:ph type="dt" sz="half" idx="10"/>
           </p:nvPr>
         </p:nvSpPr>
-        <p:spPr>
-          <a:xfrm>
-            <a:off x="457200" y="6356350"/>
-            <a:ext cx="2133600" cy="365125"/>
-          </a:xfrm>
-          <a:prstGeom prst="rect">
-            <a:avLst/>
-          </a:prstGeom>
-        </p:spPr>
+        <p:spPr/>
         <p:txBody>
           <a:bodyPr/>
           <a:lstStyle/>
@@ -2199,15 +1993,7 @@
             <p:ph type="ftr" sz="quarter" idx="11"/>
           </p:nvPr>
         </p:nvSpPr>
-        <p:spPr>
-          <a:xfrm>
-            <a:off x="3124200" y="6356350"/>
-            <a:ext cx="2895600" cy="365125"/>
-          </a:xfrm>
-          <a:prstGeom prst="rect">
-            <a:avLst/>
-          </a:prstGeom>
-        </p:spPr>
+        <p:spPr/>
         <p:txBody>
           <a:bodyPr/>
           <a:lstStyle/>
@@ -2226,15 +2012,7 @@
             <p:ph type="sldNum" sz="quarter" idx="12"/>
           </p:nvPr>
         </p:nvSpPr>
-        <p:spPr>
-          <a:xfrm>
-            <a:off x="6553200" y="6356350"/>
-            <a:ext cx="2133600" cy="365125"/>
-          </a:xfrm>
-          <a:prstGeom prst="rect">
-            <a:avLst/>
-          </a:prstGeom>
-        </p:spPr>
+        <p:spPr/>
         <p:txBody>
           <a:bodyPr/>
           <a:lstStyle/>
@@ -2469,15 +2247,7 @@
             <p:ph type="dt" sz="half" idx="10"/>
           </p:nvPr>
         </p:nvSpPr>
-        <p:spPr>
-          <a:xfrm>
-            <a:off x="457200" y="6356350"/>
-            <a:ext cx="2133600" cy="365125"/>
-          </a:xfrm>
-          <a:prstGeom prst="rect">
-            <a:avLst/>
-          </a:prstGeom>
-        </p:spPr>
+        <p:spPr/>
         <p:txBody>
           <a:bodyPr/>
           <a:lstStyle/>
@@ -2500,15 +2270,7 @@
             <p:ph type="ftr" sz="quarter" idx="11"/>
           </p:nvPr>
         </p:nvSpPr>
-        <p:spPr>
-          <a:xfrm>
-            <a:off x="3124200" y="6356350"/>
-            <a:ext cx="2895600" cy="365125"/>
-          </a:xfrm>
-          <a:prstGeom prst="rect">
-            <a:avLst/>
-          </a:prstGeom>
-        </p:spPr>
+        <p:spPr/>
         <p:txBody>
           <a:bodyPr/>
           <a:lstStyle/>
@@ -2527,15 +2289,7 @@
             <p:ph type="sldNum" sz="quarter" idx="12"/>
           </p:nvPr>
         </p:nvSpPr>
-        <p:spPr>
-          <a:xfrm>
-            <a:off x="6553200" y="6356350"/>
-            <a:ext cx="2133600" cy="365125"/>
-          </a:xfrm>
-          <a:prstGeom prst="rect">
-            <a:avLst/>
-          </a:prstGeom>
-        </p:spPr>
+        <p:spPr/>
         <p:txBody>
           <a:bodyPr/>
           <a:lstStyle/>
@@ -2746,15 +2500,7 @@
             <p:ph type="dt" sz="half" idx="10"/>
           </p:nvPr>
         </p:nvSpPr>
-        <p:spPr>
-          <a:xfrm>
-            <a:off x="457200" y="6356350"/>
-            <a:ext cx="2133600" cy="365125"/>
-          </a:xfrm>
-          <a:prstGeom prst="rect">
-            <a:avLst/>
-          </a:prstGeom>
-        </p:spPr>
+        <p:spPr/>
         <p:txBody>
           <a:bodyPr/>
           <a:lstStyle/>
@@ -2777,15 +2523,7 @@
             <p:ph type="ftr" sz="quarter" idx="11"/>
           </p:nvPr>
         </p:nvSpPr>
-        <p:spPr>
-          <a:xfrm>
-            <a:off x="3124200" y="6356350"/>
-            <a:ext cx="2895600" cy="365125"/>
-          </a:xfrm>
-          <a:prstGeom prst="rect">
-            <a:avLst/>
-          </a:prstGeom>
-        </p:spPr>
+        <p:spPr/>
         <p:txBody>
           <a:bodyPr/>
           <a:lstStyle/>
@@ -2804,15 +2542,7 @@
             <p:ph type="sldNum" sz="quarter" idx="12"/>
           </p:nvPr>
         </p:nvSpPr>
-        <p:spPr>
-          <a:xfrm>
-            <a:off x="6553200" y="6356350"/>
-            <a:ext cx="2133600" cy="365125"/>
-          </a:xfrm>
-          <a:prstGeom prst="rect">
-            <a:avLst/>
-          </a:prstGeom>
-        </p:spPr>
+        <p:spPr/>
         <p:txBody>
           <a:bodyPr/>
           <a:lstStyle/>
@@ -2955,30 +2685,125 @@
           </a:p>
         </p:txBody>
       </p:sp>
-      <p:pic>
-        <p:nvPicPr>
-          <p:cNvPr id="10" name="Picture 9"/>
-          <p:cNvPicPr>
-            <a:picLocks noChangeAspect="1"/>
-          </p:cNvPicPr>
-          <p:nvPr userDrawn="1"/>
-        </p:nvPicPr>
-        <p:blipFill>
-          <a:blip r:embed="rId13"/>
-          <a:stretch>
-            <a:fillRect/>
-          </a:stretch>
-        </p:blipFill>
+      <p:sp>
+        <p:nvSpPr>
+          <p:cNvPr id="4" name="Date Placeholder 3"/>
+          <p:cNvSpPr>
+            <a:spLocks noGrp="1"/>
+          </p:cNvSpPr>
+          <p:nvPr>
+            <p:ph type="dt" sz="half" idx="2"/>
+          </p:nvPr>
+        </p:nvSpPr>
         <p:spPr>
           <a:xfrm>
-            <a:off x="0" y="6165846"/>
-            <a:ext cx="9144000" cy="731837"/>
+            <a:off x="457200" y="6356350"/>
+            <a:ext cx="2133600" cy="365125"/>
           </a:xfrm>
           <a:prstGeom prst="rect">
             <a:avLst/>
           </a:prstGeom>
         </p:spPr>
-      </p:pic>
+        <p:txBody>
+          <a:bodyPr vert="horz" lIns="91440" tIns="45720" rIns="91440" bIns="45720" rtlCol="0" anchor="ctr"/>
+          <a:lstStyle>
+            <a:lvl1pPr algn="l">
+              <a:defRPr sz="1200">
+                <a:solidFill>
+                  <a:schemeClr val="tx1">
+                    <a:tint val="75000"/>
+                  </a:schemeClr>
+                </a:solidFill>
+              </a:defRPr>
+            </a:lvl1pPr>
+          </a:lstStyle>
+          <a:p>
+            <a:fld id="{0E51EAF3-1DF3-5E46-B025-9BD5DEE14AD6}" type="datetimeFigureOut">
+              <a:rPr lang="en-US" smtClean="0"/>
+              <a:t>17/05/15</a:t>
+            </a:fld>
+            <a:endParaRPr lang="en-US"/>
+          </a:p>
+        </p:txBody>
+      </p:sp>
+      <p:sp>
+        <p:nvSpPr>
+          <p:cNvPr id="5" name="Footer Placeholder 4"/>
+          <p:cNvSpPr>
+            <a:spLocks noGrp="1"/>
+          </p:cNvSpPr>
+          <p:nvPr>
+            <p:ph type="ftr" sz="quarter" idx="3"/>
+          </p:nvPr>
+        </p:nvSpPr>
+        <p:spPr>
+          <a:xfrm>
+            <a:off x="3124200" y="6356350"/>
+            <a:ext cx="2895600" cy="365125"/>
+          </a:xfrm>
+          <a:prstGeom prst="rect">
+            <a:avLst/>
+          </a:prstGeom>
+        </p:spPr>
+        <p:txBody>
+          <a:bodyPr vert="horz" lIns="91440" tIns="45720" rIns="91440" bIns="45720" rtlCol="0" anchor="ctr"/>
+          <a:lstStyle>
+            <a:lvl1pPr algn="ctr">
+              <a:defRPr sz="1200">
+                <a:solidFill>
+                  <a:schemeClr val="tx1">
+                    <a:tint val="75000"/>
+                  </a:schemeClr>
+                </a:solidFill>
+              </a:defRPr>
+            </a:lvl1pPr>
+          </a:lstStyle>
+          <a:p>
+            <a:endParaRPr lang="en-US"/>
+          </a:p>
+        </p:txBody>
+      </p:sp>
+      <p:sp>
+        <p:nvSpPr>
+          <p:cNvPr id="6" name="Slide Number Placeholder 5"/>
+          <p:cNvSpPr>
+            <a:spLocks noGrp="1"/>
+          </p:cNvSpPr>
+          <p:nvPr>
+            <p:ph type="sldNum" sz="quarter" idx="4"/>
+          </p:nvPr>
+        </p:nvSpPr>
+        <p:spPr>
+          <a:xfrm>
+            <a:off x="6553200" y="6356350"/>
+            <a:ext cx="2133600" cy="365125"/>
+          </a:xfrm>
+          <a:prstGeom prst="rect">
+            <a:avLst/>
+          </a:prstGeom>
+        </p:spPr>
+        <p:txBody>
+          <a:bodyPr vert="horz" lIns="91440" tIns="45720" rIns="91440" bIns="45720" rtlCol="0" anchor="ctr"/>
+          <a:lstStyle>
+            <a:lvl1pPr algn="r">
+              <a:defRPr sz="1200">
+                <a:solidFill>
+                  <a:schemeClr val="tx1">
+                    <a:tint val="75000"/>
+                  </a:schemeClr>
+                </a:solidFill>
+              </a:defRPr>
+            </a:lvl1pPr>
+          </a:lstStyle>
+          <a:p>
+            <a:fld id="{8C581C69-6157-1A49-8CFB-12462AA18D5A}" type="slidenum">
+              <a:rPr lang="en-US" smtClean="0"/>
+              <a:t>‹#›</a:t>
+            </a:fld>
+            <a:endParaRPr lang="en-US"/>
+          </a:p>
+        </p:txBody>
+      </p:sp>
     </p:spTree>
     <p:extLst>
       <p:ext uri="{BB962C8B-B14F-4D97-AF65-F5344CB8AC3E}">
@@ -3002,18 +2827,18 @@
   </p:sldLayoutIdLst>
   <p:txStyles>
     <p:titleStyle>
-      <a:lvl1pPr algn="l" defTabSz="457200" rtl="0" eaLnBrk="1" latinLnBrk="0" hangingPunct="1">
+      <a:lvl1pPr algn="ctr" defTabSz="457200" rtl="0" eaLnBrk="1" latinLnBrk="0" hangingPunct="1">
         <a:spcBef>
           <a:spcPct val="0"/>
         </a:spcBef>
         <a:buNone/>
-        <a:defRPr sz="4400" b="1" kern="1200">
+        <a:defRPr sz="4400" kern="1200">
           <a:solidFill>
-            <a:srgbClr val="EBAB1C"/>
+            <a:schemeClr val="tx1"/>
           </a:solidFill>
-          <a:latin typeface="Helvetica"/>
+          <a:latin typeface="+mj-lt"/>
           <a:ea typeface="+mj-ea"/>
-          <a:cs typeface="Helvetica"/>
+          <a:cs typeface="+mj-cs"/>
         </a:defRPr>
       </a:lvl1pPr>
     </p:titleStyle>
@@ -3028,9 +2853,9 @@
           <a:solidFill>
             <a:schemeClr val="tx1"/>
           </a:solidFill>
-          <a:latin typeface="Helvetica"/>
+          <a:latin typeface="+mn-lt"/>
           <a:ea typeface="+mn-ea"/>
-          <a:cs typeface="Helvetica"/>
+          <a:cs typeface="+mn-cs"/>
         </a:defRPr>
       </a:lvl1pPr>
       <a:lvl2pPr marL="742950" indent="-285750" algn="l" defTabSz="457200" rtl="0" eaLnBrk="1" latinLnBrk="0" hangingPunct="1">
@@ -3043,9 +2868,9 @@
           <a:solidFill>
             <a:schemeClr val="tx1"/>
           </a:solidFill>
-          <a:latin typeface="Helvetica"/>
+          <a:latin typeface="+mn-lt"/>
           <a:ea typeface="+mn-ea"/>
-          <a:cs typeface="Helvetica"/>
+          <a:cs typeface="+mn-cs"/>
         </a:defRPr>
       </a:lvl2pPr>
       <a:lvl3pPr marL="1143000" indent="-228600" algn="l" defTabSz="457200" rtl="0" eaLnBrk="1" latinLnBrk="0" hangingPunct="1">
@@ -3058,9 +2883,9 @@
           <a:solidFill>
             <a:schemeClr val="tx1"/>
           </a:solidFill>
-          <a:latin typeface="Helvetica"/>
+          <a:latin typeface="+mn-lt"/>
           <a:ea typeface="+mn-ea"/>
-          <a:cs typeface="Helvetica"/>
+          <a:cs typeface="+mn-cs"/>
         </a:defRPr>
       </a:lvl3pPr>
       <a:lvl4pPr marL="1600200" indent="-228600" algn="l" defTabSz="457200" rtl="0" eaLnBrk="1" latinLnBrk="0" hangingPunct="1">
@@ -3073,9 +2898,9 @@
           <a:solidFill>
             <a:schemeClr val="tx1"/>
           </a:solidFill>
-          <a:latin typeface="Helvetica"/>
+          <a:latin typeface="+mn-lt"/>
           <a:ea typeface="+mn-ea"/>
-          <a:cs typeface="Helvetica"/>
+          <a:cs typeface="+mn-cs"/>
         </a:defRPr>
       </a:lvl4pPr>
       <a:lvl5pPr marL="2057400" indent="-228600" algn="l" defTabSz="457200" rtl="0" eaLnBrk="1" latinLnBrk="0" hangingPunct="1">
@@ -3088,9 +2913,9 @@
           <a:solidFill>
             <a:schemeClr val="tx1"/>
           </a:solidFill>
-          <a:latin typeface="Helvetica"/>
+          <a:latin typeface="+mn-lt"/>
           <a:ea typeface="+mn-ea"/>
-          <a:cs typeface="Helvetica"/>
+          <a:cs typeface="+mn-cs"/>
         </a:defRPr>
       </a:lvl5pPr>
       <a:lvl6pPr marL="2514600" indent="-228600" algn="l" defTabSz="457200" rtl="0" eaLnBrk="1" latinLnBrk="0" hangingPunct="1">
@@ -3272,6 +3097,25 @@
       </p:grpSpPr>
       <p:sp>
         <p:nvSpPr>
+          <p:cNvPr id="2" name="Title 1"/>
+          <p:cNvSpPr>
+            <a:spLocks noGrp="1"/>
+          </p:cNvSpPr>
+          <p:nvPr>
+            <p:ph type="ctrTitle"/>
+          </p:nvPr>
+        </p:nvSpPr>
+        <p:spPr/>
+        <p:txBody>
+          <a:bodyPr/>
+          <a:lstStyle/>
+          <a:p>
+            <a:endParaRPr lang="en-US"/>
+          </a:p>
+        </p:txBody>
+      </p:sp>
+      <p:sp>
+        <p:nvSpPr>
           <p:cNvPr id="3" name="Subtitle 2"/>
           <p:cNvSpPr>
             <a:spLocks noGrp="1"/>
@@ -3280,227 +3124,12 @@
             <p:ph type="subTitle" idx="1"/>
           </p:nvPr>
         </p:nvSpPr>
-        <p:spPr>
-          <a:xfrm>
-            <a:off x="143395" y="4739566"/>
-            <a:ext cx="8603708" cy="928228"/>
-          </a:xfrm>
-        </p:spPr>
-        <p:txBody>
-          <a:bodyPr>
-            <a:noAutofit/>
-          </a:bodyPr>
-          <a:lstStyle/>
-          <a:p>
-            <a:r>
-              <a:rPr lang="en-US" sz="4000" b="1" u="sng" dirty="0" smtClean="0">
-                <a:solidFill>
-                  <a:srgbClr val="EBAB1C"/>
-                </a:solidFill>
-                <a:latin typeface="Arial"/>
-                <a:cs typeface="Arial"/>
-              </a:rPr>
-              <a:t>Unearthed Brisbane 2015 Hack </a:t>
-            </a:r>
-          </a:p>
-          <a:p>
-            <a:r>
-              <a:rPr lang="en-US" sz="4000" b="1" u="sng" dirty="0" smtClean="0">
-                <a:solidFill>
-                  <a:srgbClr val="CB31B0"/>
-                </a:solidFill>
-              </a:rPr>
-              <a:t> </a:t>
-            </a:r>
-            <a:endParaRPr lang="en-US" sz="4000" b="1" u="sng" dirty="0">
-              <a:solidFill>
-                <a:srgbClr val="CB31B0"/>
-              </a:solidFill>
-            </a:endParaRPr>
-          </a:p>
-        </p:txBody>
-      </p:sp>
-      <p:pic>
-        <p:nvPicPr>
-          <p:cNvPr id="4" name="Picture 3"/>
-          <p:cNvPicPr>
-            <a:picLocks noChangeAspect="1"/>
-          </p:cNvPicPr>
-          <p:nvPr/>
-        </p:nvPicPr>
-        <p:blipFill>
-          <a:blip r:embed="rId2"/>
-          <a:stretch>
-            <a:fillRect/>
-          </a:stretch>
-        </p:blipFill>
-        <p:spPr>
-          <a:xfrm>
-            <a:off x="5391472" y="998989"/>
-            <a:ext cx="2540000" cy="2540000"/>
-          </a:xfrm>
-          <a:prstGeom prst="rect">
-            <a:avLst/>
-          </a:prstGeom>
-        </p:spPr>
-      </p:pic>
-      <p:pic>
-        <p:nvPicPr>
-          <p:cNvPr id="5" name="Picture 4"/>
-          <p:cNvPicPr>
-            <a:picLocks noChangeAspect="1"/>
-          </p:cNvPicPr>
-          <p:nvPr/>
-        </p:nvPicPr>
-        <p:blipFill>
-          <a:blip r:embed="rId3"/>
-          <a:stretch>
-            <a:fillRect/>
-          </a:stretch>
-        </p:blipFill>
-        <p:spPr>
-          <a:xfrm>
-            <a:off x="1310145" y="1080937"/>
-            <a:ext cx="2540000" cy="2540000"/>
-          </a:xfrm>
-          <a:prstGeom prst="rect">
-            <a:avLst/>
-          </a:prstGeom>
-        </p:spPr>
-      </p:pic>
-      <p:sp>
-        <p:nvSpPr>
-          <p:cNvPr id="7" name="Rectangle 6"/>
-          <p:cNvSpPr/>
-          <p:nvPr/>
-        </p:nvSpPr>
-        <p:spPr>
-          <a:xfrm>
-            <a:off x="3508296" y="3290028"/>
-            <a:ext cx="2247994" cy="954107"/>
-          </a:xfrm>
-          <a:prstGeom prst="rect">
-            <a:avLst/>
-          </a:prstGeom>
-        </p:spPr>
-        <p:txBody>
-          <a:bodyPr wrap="square">
-            <a:spAutoFit/>
-          </a:bodyPr>
-          <a:lstStyle/>
-          <a:p>
-            <a:pPr algn="ctr"/>
-            <a:r>
-              <a:rPr lang="en-US" sz="2800" b="1" dirty="0" smtClean="0">
-                <a:solidFill>
-                  <a:srgbClr val="DC36B3"/>
-                </a:solidFill>
-                <a:latin typeface="Helvetica"/>
-                <a:cs typeface="Helvetica"/>
-              </a:rPr>
-              <a:t>Team </a:t>
-            </a:r>
-            <a:r>
-              <a:rPr lang="en-US" sz="2800" b="1" dirty="0" err="1" smtClean="0">
-                <a:solidFill>
-                  <a:srgbClr val="DC36B3"/>
-                </a:solidFill>
-                <a:latin typeface="Helvetica"/>
-                <a:cs typeface="Helvetica"/>
-              </a:rPr>
-              <a:t>Berry&amp;Co</a:t>
-            </a:r>
-            <a:r>
-              <a:rPr lang="en-US" sz="2800" b="1" dirty="0" smtClean="0">
-                <a:solidFill>
-                  <a:srgbClr val="DC36B3"/>
-                </a:solidFill>
-                <a:latin typeface="Helvetica"/>
-                <a:cs typeface="Helvetica"/>
-              </a:rPr>
-              <a:t>.</a:t>
-            </a:r>
-            <a:endParaRPr lang="en-US" sz="2800" b="1" dirty="0" smtClean="0">
-              <a:solidFill>
-                <a:srgbClr val="DC36B3"/>
-              </a:solidFill>
-              <a:latin typeface="Helvetica"/>
-              <a:cs typeface="Helvetica"/>
-            </a:endParaRPr>
-          </a:p>
-        </p:txBody>
-      </p:sp>
-      <p:sp>
-        <p:nvSpPr>
-          <p:cNvPr id="8" name="TextBox 7"/>
-          <p:cNvSpPr txBox="1"/>
-          <p:nvPr/>
-        </p:nvSpPr>
-        <p:spPr>
-          <a:xfrm>
-            <a:off x="1392085" y="3641424"/>
-            <a:ext cx="2198151" cy="461665"/>
-          </a:xfrm>
-          <a:prstGeom prst="rect">
-            <a:avLst/>
-          </a:prstGeom>
-          <a:noFill/>
-        </p:spPr>
-        <p:txBody>
-          <a:bodyPr wrap="square" rtlCol="0">
-            <a:spAutoFit/>
-          </a:bodyPr>
-          <a:lstStyle/>
-          <a:p>
-            <a:pPr algn="ctr"/>
-            <a:r>
-              <a:rPr lang="en-US" sz="2400" b="1" i="1" dirty="0" smtClean="0">
-                <a:latin typeface="Helvetica"/>
-                <a:cs typeface="Helvetica"/>
-              </a:rPr>
-              <a:t>Code</a:t>
-            </a:r>
-            <a:endParaRPr lang="en-US" sz="2400" b="1" i="1" dirty="0">
-              <a:latin typeface="Helvetica"/>
-              <a:cs typeface="Helvetica"/>
-            </a:endParaRPr>
-          </a:p>
-        </p:txBody>
-      </p:sp>
-      <p:sp>
-        <p:nvSpPr>
-          <p:cNvPr id="9" name="TextBox 8"/>
-          <p:cNvSpPr txBox="1"/>
-          <p:nvPr/>
-        </p:nvSpPr>
-        <p:spPr>
-          <a:xfrm>
-            <a:off x="5845221" y="3579963"/>
-            <a:ext cx="2065766" cy="461665"/>
-          </a:xfrm>
-          <a:prstGeom prst="rect">
-            <a:avLst/>
-          </a:prstGeom>
-          <a:noFill/>
-        </p:spPr>
-        <p:txBody>
-          <a:bodyPr wrap="square" rtlCol="0">
-            <a:spAutoFit/>
-          </a:bodyPr>
-          <a:lstStyle/>
-          <a:p>
-            <a:pPr algn="ctr"/>
-            <a:r>
-              <a:rPr lang="en-US" sz="2400" b="1" i="1" dirty="0" smtClean="0">
-                <a:latin typeface="Helvetica"/>
-                <a:cs typeface="Helvetica"/>
-              </a:rPr>
-              <a:t>Data</a:t>
-            </a:r>
-            <a:endParaRPr lang="en-US" sz="2400" b="1" i="1" dirty="0">
-              <a:latin typeface="Helvetica"/>
-              <a:cs typeface="Helvetica"/>
-            </a:endParaRPr>
+        <p:spPr/>
+        <p:txBody>
+          <a:bodyPr/>
+          <a:lstStyle/>
+          <a:p>
+            <a:endParaRPr lang="en-US"/>
           </a:p>
         </p:txBody>
       </p:sp>
@@ -3508,584 +3137,6 @@
     <p:extLst>
       <p:ext uri="{BB962C8B-B14F-4D97-AF65-F5344CB8AC3E}">
         <p14:creationId xmlns:p14="http://schemas.microsoft.com/office/powerpoint/2010/main" val="3056483909"/>
-      </p:ext>
-    </p:extLst>
-  </p:cSld>
-  <p:clrMapOvr>
-    <a:masterClrMapping/>
-  </p:clrMapOvr>
-  <p:timing>
-    <p:tnLst>
-      <p:par>
-        <p:cTn xmlns:p14="http://schemas.microsoft.com/office/powerpoint/2010/main" id="1" dur="indefinite" restart="never" nodeType="tmRoot"/>
-      </p:par>
-    </p:tnLst>
-  </p:timing>
-</p:sld>
-</file>
-
-<file path=ppt/slides/slide2.xml><?xml version="1.0" encoding="utf-8"?>
-<p:sld xmlns:a="http://schemas.openxmlformats.org/drawingml/2006/main" xmlns:r="http://schemas.openxmlformats.org/officeDocument/2006/relationships" xmlns:p="http://schemas.openxmlformats.org/presentationml/2006/main">
-  <p:cSld>
-    <p:spTree>
-      <p:nvGrpSpPr>
-        <p:cNvPr id="1" name=""/>
-        <p:cNvGrpSpPr/>
-        <p:nvPr/>
-      </p:nvGrpSpPr>
-      <p:grpSpPr>
-        <a:xfrm>
-          <a:off x="0" y="0"/>
-          <a:ext cx="0" cy="0"/>
-          <a:chOff x="0" y="0"/>
-          <a:chExt cx="0" cy="0"/>
-        </a:xfrm>
-      </p:grpSpPr>
-      <p:sp>
-        <p:nvSpPr>
-          <p:cNvPr id="2" name="Title 1"/>
-          <p:cNvSpPr>
-            <a:spLocks noGrp="1"/>
-          </p:cNvSpPr>
-          <p:nvPr>
-            <p:ph type="title"/>
-          </p:nvPr>
-        </p:nvSpPr>
-        <p:spPr/>
-        <p:txBody>
-          <a:bodyPr>
-            <a:normAutofit fontScale="90000"/>
-          </a:bodyPr>
-          <a:lstStyle/>
-          <a:p>
-            <a:pPr algn="l"/>
-            <a:r>
-              <a:rPr lang="en-US" b="1" dirty="0" smtClean="0">
-                <a:solidFill>
-                  <a:srgbClr val="EBAB1C"/>
-                </a:solidFill>
-              </a:rPr>
-              <a:t>28,000 Hours and $$ equivalent</a:t>
-            </a:r>
-            <a:endParaRPr lang="en-US" b="1" dirty="0">
-              <a:solidFill>
-                <a:srgbClr val="EBAB1C"/>
-              </a:solidFill>
-            </a:endParaRPr>
-          </a:p>
-        </p:txBody>
-      </p:sp>
-      <p:sp>
-        <p:nvSpPr>
-          <p:cNvPr id="3" name="Content Placeholder 2"/>
-          <p:cNvSpPr>
-            <a:spLocks noGrp="1"/>
-          </p:cNvSpPr>
-          <p:nvPr>
-            <p:ph idx="1"/>
-          </p:nvPr>
-        </p:nvSpPr>
-        <p:spPr/>
-        <p:txBody>
-          <a:bodyPr/>
-          <a:lstStyle/>
-          <a:p>
-            <a:r>
-              <a:rPr lang="en-US" dirty="0" smtClean="0">
-                <a:solidFill>
-                  <a:srgbClr val="FF0000"/>
-                </a:solidFill>
-              </a:rPr>
-              <a:t>Problem definition slide: </a:t>
-            </a:r>
-          </a:p>
-          <a:p>
-            <a:r>
-              <a:rPr lang="en-US" dirty="0" smtClean="0">
-                <a:solidFill>
-                  <a:srgbClr val="FF0000"/>
-                </a:solidFill>
-              </a:rPr>
-              <a:t>Ask for </a:t>
-            </a:r>
-            <a:r>
-              <a:rPr lang="en-US" dirty="0" err="1" smtClean="0">
-                <a:solidFill>
-                  <a:srgbClr val="FF0000"/>
-                </a:solidFill>
-              </a:rPr>
-              <a:t>zayn</a:t>
-            </a:r>
-            <a:r>
-              <a:rPr lang="en-US" dirty="0" smtClean="0">
-                <a:solidFill>
-                  <a:srgbClr val="FF0000"/>
-                </a:solidFill>
-              </a:rPr>
-              <a:t>/</a:t>
-            </a:r>
-            <a:r>
-              <a:rPr lang="en-US" dirty="0" err="1" smtClean="0">
-                <a:solidFill>
-                  <a:srgbClr val="FF0000"/>
-                </a:solidFill>
-              </a:rPr>
-              <a:t>andrew</a:t>
-            </a:r>
-            <a:r>
-              <a:rPr lang="en-US" dirty="0" smtClean="0">
-                <a:solidFill>
-                  <a:srgbClr val="FF0000"/>
-                </a:solidFill>
-              </a:rPr>
-              <a:t> for problem statement</a:t>
-            </a:r>
-          </a:p>
-          <a:p>
-            <a:r>
-              <a:rPr lang="en-US" dirty="0" smtClean="0">
-                <a:solidFill>
-                  <a:srgbClr val="FF0000"/>
-                </a:solidFill>
-              </a:rPr>
-              <a:t>Delay receiving record and evaluating, increase breakdowns, risks and costs </a:t>
-            </a:r>
-          </a:p>
-          <a:p>
-            <a:endParaRPr lang="en-US" dirty="0">
-              <a:solidFill>
-                <a:srgbClr val="FF0000"/>
-              </a:solidFill>
-            </a:endParaRPr>
-          </a:p>
-        </p:txBody>
-      </p:sp>
-    </p:spTree>
-    <p:extLst>
-      <p:ext uri="{BB962C8B-B14F-4D97-AF65-F5344CB8AC3E}">
-        <p14:creationId xmlns:p14="http://schemas.microsoft.com/office/powerpoint/2010/main" val="1419967020"/>
-      </p:ext>
-    </p:extLst>
-  </p:cSld>
-  <p:clrMapOvr>
-    <a:masterClrMapping/>
-  </p:clrMapOvr>
-  <p:timing>
-    <p:tnLst>
-      <p:par>
-        <p:cTn xmlns:p14="http://schemas.microsoft.com/office/powerpoint/2010/main" id="1" dur="indefinite" restart="never" nodeType="tmRoot"/>
-      </p:par>
-    </p:tnLst>
-  </p:timing>
-</p:sld>
-</file>
-
-<file path=ppt/slides/slide3.xml><?xml version="1.0" encoding="utf-8"?>
-<p:sld xmlns:a="http://schemas.openxmlformats.org/drawingml/2006/main" xmlns:r="http://schemas.openxmlformats.org/officeDocument/2006/relationships" xmlns:p="http://schemas.openxmlformats.org/presentationml/2006/main">
-  <p:cSld>
-    <p:spTree>
-      <p:nvGrpSpPr>
-        <p:cNvPr id="1" name=""/>
-        <p:cNvGrpSpPr/>
-        <p:nvPr/>
-      </p:nvGrpSpPr>
-      <p:grpSpPr>
-        <a:xfrm>
-          <a:off x="0" y="0"/>
-          <a:ext cx="0" cy="0"/>
-          <a:chOff x="0" y="0"/>
-          <a:chExt cx="0" cy="0"/>
-        </a:xfrm>
-      </p:grpSpPr>
-      <p:sp>
-        <p:nvSpPr>
-          <p:cNvPr id="2" name="Title 1"/>
-          <p:cNvSpPr>
-            <a:spLocks noGrp="1"/>
-          </p:cNvSpPr>
-          <p:nvPr>
-            <p:ph type="title"/>
-          </p:nvPr>
-        </p:nvSpPr>
-        <p:spPr/>
-        <p:txBody>
-          <a:bodyPr/>
-          <a:lstStyle/>
-          <a:p>
-            <a:r>
-              <a:rPr lang="en-US" dirty="0" smtClean="0"/>
-              <a:t>Demo</a:t>
-            </a:r>
-            <a:endParaRPr lang="en-US" dirty="0"/>
-          </a:p>
-        </p:txBody>
-      </p:sp>
-      <p:sp>
-        <p:nvSpPr>
-          <p:cNvPr id="3" name="Content Placeholder 2"/>
-          <p:cNvSpPr>
-            <a:spLocks noGrp="1"/>
-          </p:cNvSpPr>
-          <p:nvPr>
-            <p:ph idx="1"/>
-          </p:nvPr>
-        </p:nvSpPr>
-        <p:spPr/>
-        <p:txBody>
-          <a:bodyPr/>
-          <a:lstStyle/>
-          <a:p>
-            <a:endParaRPr lang="en-US" dirty="0"/>
-          </a:p>
-        </p:txBody>
-      </p:sp>
-    </p:spTree>
-    <p:extLst>
-      <p:ext uri="{BB962C8B-B14F-4D97-AF65-F5344CB8AC3E}">
-        <p14:creationId xmlns:p14="http://schemas.microsoft.com/office/powerpoint/2010/main" val="3389538974"/>
-      </p:ext>
-    </p:extLst>
-  </p:cSld>
-  <p:clrMapOvr>
-    <a:masterClrMapping/>
-  </p:clrMapOvr>
-  <p:timing>
-    <p:tnLst>
-      <p:par>
-        <p:cTn xmlns:p14="http://schemas.microsoft.com/office/powerpoint/2010/main" id="1" dur="indefinite" restart="never" nodeType="tmRoot"/>
-      </p:par>
-    </p:tnLst>
-  </p:timing>
-</p:sld>
-</file>
-
-<file path=ppt/slides/slide4.xml><?xml version="1.0" encoding="utf-8"?>
-<p:sld xmlns:a="http://schemas.openxmlformats.org/drawingml/2006/main" xmlns:r="http://schemas.openxmlformats.org/officeDocument/2006/relationships" xmlns:p="http://schemas.openxmlformats.org/presentationml/2006/main">
-  <p:cSld>
-    <p:spTree>
-      <p:nvGrpSpPr>
-        <p:cNvPr id="1" name=""/>
-        <p:cNvGrpSpPr/>
-        <p:nvPr/>
-      </p:nvGrpSpPr>
-      <p:grpSpPr>
-        <a:xfrm>
-          <a:off x="0" y="0"/>
-          <a:ext cx="0" cy="0"/>
-          <a:chOff x="0" y="0"/>
-          <a:chExt cx="0" cy="0"/>
-        </a:xfrm>
-      </p:grpSpPr>
-      <p:sp>
-        <p:nvSpPr>
-          <p:cNvPr id="2" name="Title 1"/>
-          <p:cNvSpPr>
-            <a:spLocks noGrp="1"/>
-          </p:cNvSpPr>
-          <p:nvPr>
-            <p:ph type="title"/>
-          </p:nvPr>
-        </p:nvSpPr>
-        <p:spPr/>
-        <p:txBody>
-          <a:bodyPr/>
-          <a:lstStyle/>
-          <a:p>
-            <a:r>
-              <a:rPr lang="en-US" dirty="0" smtClean="0"/>
-              <a:t>Methodology</a:t>
-            </a:r>
-            <a:endParaRPr lang="en-US" dirty="0"/>
-          </a:p>
-        </p:txBody>
-      </p:sp>
-      <p:sp>
-        <p:nvSpPr>
-          <p:cNvPr id="3" name="Content Placeholder 2"/>
-          <p:cNvSpPr>
-            <a:spLocks noGrp="1"/>
-          </p:cNvSpPr>
-          <p:nvPr>
-            <p:ph idx="1"/>
-          </p:nvPr>
-        </p:nvSpPr>
-        <p:spPr/>
-        <p:txBody>
-          <a:bodyPr/>
-          <a:lstStyle/>
-          <a:p>
-            <a:endParaRPr lang="en-US" dirty="0"/>
-          </a:p>
-        </p:txBody>
-      </p:sp>
-    </p:spTree>
-    <p:extLst>
-      <p:ext uri="{BB962C8B-B14F-4D97-AF65-F5344CB8AC3E}">
-        <p14:creationId xmlns:p14="http://schemas.microsoft.com/office/powerpoint/2010/main" val="945356408"/>
-      </p:ext>
-    </p:extLst>
-  </p:cSld>
-  <p:clrMapOvr>
-    <a:masterClrMapping/>
-  </p:clrMapOvr>
-</p:sld>
-</file>
-
-<file path=ppt/slides/slide5.xml><?xml version="1.0" encoding="utf-8"?>
-<p:sld xmlns:a="http://schemas.openxmlformats.org/drawingml/2006/main" xmlns:r="http://schemas.openxmlformats.org/officeDocument/2006/relationships" xmlns:p="http://schemas.openxmlformats.org/presentationml/2006/main">
-  <p:cSld>
-    <p:spTree>
-      <p:nvGrpSpPr>
-        <p:cNvPr id="1" name=""/>
-        <p:cNvGrpSpPr/>
-        <p:nvPr/>
-      </p:nvGrpSpPr>
-      <p:grpSpPr>
-        <a:xfrm>
-          <a:off x="0" y="0"/>
-          <a:ext cx="0" cy="0"/>
-          <a:chOff x="0" y="0"/>
-          <a:chExt cx="0" cy="0"/>
-        </a:xfrm>
-      </p:grpSpPr>
-      <p:sp>
-        <p:nvSpPr>
-          <p:cNvPr id="2" name="Title 1"/>
-          <p:cNvSpPr>
-            <a:spLocks noGrp="1"/>
-          </p:cNvSpPr>
-          <p:nvPr>
-            <p:ph type="title"/>
-          </p:nvPr>
-        </p:nvSpPr>
-        <p:spPr/>
-        <p:txBody>
-          <a:bodyPr/>
-          <a:lstStyle/>
-          <a:p>
-            <a:r>
-              <a:rPr lang="en-US" dirty="0" smtClean="0"/>
-              <a:t>Showing you the way!</a:t>
-            </a:r>
-            <a:endParaRPr lang="en-US" dirty="0"/>
-          </a:p>
-        </p:txBody>
-      </p:sp>
-      <p:sp>
-        <p:nvSpPr>
-          <p:cNvPr id="3" name="Content Placeholder 2"/>
-          <p:cNvSpPr>
-            <a:spLocks noGrp="1"/>
-          </p:cNvSpPr>
-          <p:nvPr>
-            <p:ph idx="1"/>
-          </p:nvPr>
-        </p:nvSpPr>
-        <p:spPr/>
-        <p:txBody>
-          <a:bodyPr/>
-          <a:lstStyle/>
-          <a:p>
-            <a:endParaRPr lang="en-US"/>
-          </a:p>
-        </p:txBody>
-      </p:sp>
-    </p:spTree>
-    <p:extLst>
-      <p:ext uri="{BB962C8B-B14F-4D97-AF65-F5344CB8AC3E}">
-        <p14:creationId xmlns:p14="http://schemas.microsoft.com/office/powerpoint/2010/main" val="2199856207"/>
-      </p:ext>
-    </p:extLst>
-  </p:cSld>
-  <p:clrMapOvr>
-    <a:masterClrMapping/>
-  </p:clrMapOvr>
-</p:sld>
-</file>
-
-<file path=ppt/slides/slide6.xml><?xml version="1.0" encoding="utf-8"?>
-<p:sld xmlns:a="http://schemas.openxmlformats.org/drawingml/2006/main" xmlns:r="http://schemas.openxmlformats.org/officeDocument/2006/relationships" xmlns:p="http://schemas.openxmlformats.org/presentationml/2006/main">
-  <p:cSld>
-    <p:spTree>
-      <p:nvGrpSpPr>
-        <p:cNvPr id="1" name=""/>
-        <p:cNvGrpSpPr/>
-        <p:nvPr/>
-      </p:nvGrpSpPr>
-      <p:grpSpPr>
-        <a:xfrm>
-          <a:off x="0" y="0"/>
-          <a:ext cx="0" cy="0"/>
-          <a:chOff x="0" y="0"/>
-          <a:chExt cx="0" cy="0"/>
-        </a:xfrm>
-      </p:grpSpPr>
-      <p:sp>
-        <p:nvSpPr>
-          <p:cNvPr id="2" name="Title 1"/>
-          <p:cNvSpPr>
-            <a:spLocks noGrp="1"/>
-          </p:cNvSpPr>
-          <p:nvPr>
-            <p:ph type="title"/>
-          </p:nvPr>
-        </p:nvSpPr>
-        <p:spPr/>
-        <p:txBody>
-          <a:bodyPr/>
-          <a:lstStyle/>
-          <a:p>
-            <a:r>
-              <a:rPr lang="en-US" dirty="0" smtClean="0"/>
-              <a:t>Next steps…</a:t>
-            </a:r>
-            <a:endParaRPr lang="en-US" dirty="0"/>
-          </a:p>
-        </p:txBody>
-      </p:sp>
-      <p:sp>
-        <p:nvSpPr>
-          <p:cNvPr id="3" name="Content Placeholder 2"/>
-          <p:cNvSpPr>
-            <a:spLocks noGrp="1"/>
-          </p:cNvSpPr>
-          <p:nvPr>
-            <p:ph idx="1"/>
-          </p:nvPr>
-        </p:nvSpPr>
-        <p:spPr/>
-        <p:txBody>
-          <a:bodyPr/>
-          <a:lstStyle/>
-          <a:p>
-            <a:r>
-              <a:rPr lang="en-US" dirty="0" smtClean="0"/>
-              <a:t>Electronic data </a:t>
-            </a:r>
-            <a:endParaRPr lang="en-US" dirty="0"/>
-          </a:p>
-        </p:txBody>
-      </p:sp>
-    </p:spTree>
-    <p:extLst>
-      <p:ext uri="{BB962C8B-B14F-4D97-AF65-F5344CB8AC3E}">
-        <p14:creationId xmlns:p14="http://schemas.microsoft.com/office/powerpoint/2010/main" val="2082605019"/>
-      </p:ext>
-    </p:extLst>
-  </p:cSld>
-  <p:clrMapOvr>
-    <a:masterClrMapping/>
-  </p:clrMapOvr>
-</p:sld>
-</file>
-
-<file path=ppt/slides/slide7.xml><?xml version="1.0" encoding="utf-8"?>
-<p:sld xmlns:a="http://schemas.openxmlformats.org/drawingml/2006/main" xmlns:r="http://schemas.openxmlformats.org/officeDocument/2006/relationships" xmlns:p="http://schemas.openxmlformats.org/presentationml/2006/main">
-  <p:cSld>
-    <p:spTree>
-      <p:nvGrpSpPr>
-        <p:cNvPr id="1" name=""/>
-        <p:cNvGrpSpPr/>
-        <p:nvPr/>
-      </p:nvGrpSpPr>
-      <p:grpSpPr>
-        <a:xfrm>
-          <a:off x="0" y="0"/>
-          <a:ext cx="0" cy="0"/>
-          <a:chOff x="0" y="0"/>
-          <a:chExt cx="0" cy="0"/>
-        </a:xfrm>
-      </p:grpSpPr>
-      <p:sp>
-        <p:nvSpPr>
-          <p:cNvPr id="2" name="Title 1"/>
-          <p:cNvSpPr>
-            <a:spLocks noGrp="1"/>
-          </p:cNvSpPr>
-          <p:nvPr>
-            <p:ph type="title"/>
-          </p:nvPr>
-        </p:nvSpPr>
-        <p:spPr/>
-        <p:txBody>
-          <a:bodyPr/>
-          <a:lstStyle/>
-          <a:p>
-            <a:r>
-              <a:rPr lang="en-US" dirty="0" smtClean="0"/>
-              <a:t>Potential Questions</a:t>
-            </a:r>
-            <a:endParaRPr lang="en-US" dirty="0"/>
-          </a:p>
-        </p:txBody>
-      </p:sp>
-      <p:sp>
-        <p:nvSpPr>
-          <p:cNvPr id="3" name="Content Placeholder 2"/>
-          <p:cNvSpPr>
-            <a:spLocks noGrp="1"/>
-          </p:cNvSpPr>
-          <p:nvPr>
-            <p:ph idx="1"/>
-          </p:nvPr>
-        </p:nvSpPr>
-        <p:spPr/>
-        <p:txBody>
-          <a:bodyPr>
-            <a:normAutofit fontScale="92500"/>
-          </a:bodyPr>
-          <a:lstStyle/>
-          <a:p>
-            <a:r>
-              <a:rPr lang="en-US" dirty="0" smtClean="0"/>
-              <a:t>- sold dream about future, not just technical </a:t>
-            </a:r>
-          </a:p>
-          <a:p>
-            <a:r>
-              <a:rPr lang="en-US" dirty="0" smtClean="0"/>
-              <a:t>Target user and need</a:t>
-            </a:r>
-          </a:p>
-          <a:p>
-            <a:r>
-              <a:rPr lang="en-US" dirty="0" smtClean="0"/>
-              <a:t>How is this unique/best solution</a:t>
-            </a:r>
-          </a:p>
-          <a:p>
-            <a:r>
-              <a:rPr lang="en-US" dirty="0" smtClean="0"/>
-              <a:t>Scaling? </a:t>
-            </a:r>
-          </a:p>
-          <a:p>
-            <a:r>
-              <a:rPr lang="en-US" dirty="0" smtClean="0"/>
-              <a:t>What did we do over the weekend</a:t>
-            </a:r>
-          </a:p>
-          <a:p>
-            <a:r>
-              <a:rPr lang="en-US" dirty="0" smtClean="0"/>
-              <a:t>Demo the hard part </a:t>
-            </a:r>
-          </a:p>
-          <a:p>
-            <a:r>
-              <a:rPr lang="en-US" dirty="0" smtClean="0"/>
-              <a:t>Problem (short and deep). Demonstration. Uniqueness/UI. Solved conclusion. </a:t>
-            </a:r>
-          </a:p>
-          <a:p>
-            <a:endParaRPr lang="en-US" dirty="0" smtClean="0"/>
-          </a:p>
-        </p:txBody>
-      </p:sp>
-    </p:spTree>
-    <p:extLst>
-      <p:ext uri="{BB962C8B-B14F-4D97-AF65-F5344CB8AC3E}">
-        <p14:creationId xmlns:p14="http://schemas.microsoft.com/office/powerpoint/2010/main" val="2205877080"/>
       </p:ext>
     </p:extLst>
   </p:cSld>

</xml_diff>